<commit_message>
Prep for final submission
</commit_message>
<xml_diff>
--- a/Final Project.pptx
+++ b/Final Project.pptx
@@ -5,10 +5,10 @@
     <p:sldMasterId id="2147483648" r:id="rId4"/>
   </p:sldMasterIdLst>
   <p:notesMasterIdLst>
-    <p:notesMasterId r:id="rId19"/>
+    <p:notesMasterId r:id="rId20"/>
   </p:notesMasterIdLst>
   <p:handoutMasterIdLst>
-    <p:handoutMasterId r:id="rId20"/>
+    <p:handoutMasterId r:id="rId21"/>
   </p:handoutMasterIdLst>
   <p:sldIdLst>
     <p:sldId id="256" r:id="rId5"/>
@@ -21,10 +21,11 @@
     <p:sldId id="273" r:id="rId12"/>
     <p:sldId id="268" r:id="rId13"/>
     <p:sldId id="262" r:id="rId14"/>
-    <p:sldId id="263" r:id="rId15"/>
-    <p:sldId id="264" r:id="rId16"/>
-    <p:sldId id="265" r:id="rId17"/>
-    <p:sldId id="275" r:id="rId18"/>
+    <p:sldId id="276" r:id="rId15"/>
+    <p:sldId id="277" r:id="rId16"/>
+    <p:sldId id="278" r:id="rId17"/>
+    <p:sldId id="279" r:id="rId18"/>
+    <p:sldId id="275" r:id="rId19"/>
   </p:sldIdLst>
   <p:sldSz cx="12192000" cy="6858000"/>
   <p:notesSz cx="6858000" cy="9144000"/>
@@ -698,22 +699,10 @@
           <a:bodyPr/>
           <a:lstStyle/>
           <a:p>
-            <a:r>
-              <a:rPr lang="en-US" b="1" i="1" dirty="0">
-                <a:latin typeface="Arial" pitchFamily="34" charset="0"/>
-                <a:cs typeface="Arial" pitchFamily="34" charset="0"/>
-              </a:rPr>
-              <a:t>NOTE:</a:t>
-            </a:r>
-          </a:p>
-          <a:p>
-            <a:r>
-              <a:rPr lang="en-US" i="1" dirty="0">
-                <a:latin typeface="Arial" pitchFamily="34" charset="0"/>
-                <a:cs typeface="Arial" pitchFamily="34" charset="0"/>
-              </a:rPr>
-              <a:t>To change the  image on this slide, select the picture and delete it. Then click the Pictures icon in the placeholder to insert your own image.</a:t>
-            </a:r>
+            <a:endParaRPr lang="en-US" b="1" i="1" dirty="0">
+              <a:latin typeface="Arial" pitchFamily="34" charset="0"/>
+              <a:cs typeface="Arial" pitchFamily="34" charset="0"/>
+            </a:endParaRPr>
           </a:p>
         </p:txBody>
       </p:sp>
@@ -5086,87 +5075,96 @@
           <a:p>
             <a:r>
               <a:rPr lang="en-US" dirty="0"/>
-              <a:t>Add a Slide Title - 3</a:t>
-            </a:r>
-          </a:p>
-        </p:txBody>
-      </p:sp>
-      <p:sp>
-        <p:nvSpPr>
-          <p:cNvPr id="3" name="Text Placeholder 2"/>
-          <p:cNvSpPr>
-            <a:spLocks noGrp="1"/>
-          </p:cNvSpPr>
-          <p:nvPr>
-            <p:ph type="body" idx="1"/>
-          </p:nvPr>
-        </p:nvSpPr>
-        <p:spPr/>
+              <a:t>Item Implementation</a:t>
+            </a:r>
+          </a:p>
+        </p:txBody>
+      </p:sp>
+      <p:sp>
+        <p:nvSpPr>
+          <p:cNvPr id="4" name="Content Placeholder 3"/>
+          <p:cNvSpPr>
+            <a:spLocks noGrp="1"/>
+          </p:cNvSpPr>
+          <p:nvPr>
+            <p:ph sz="half" idx="2"/>
+          </p:nvPr>
+        </p:nvSpPr>
+        <p:spPr>
+          <a:xfrm>
+            <a:off x="1104901" y="1509624"/>
+            <a:ext cx="2923636" cy="4325928"/>
+          </a:xfrm>
+        </p:spPr>
         <p:txBody>
           <a:bodyPr/>
           <a:lstStyle/>
           <a:p>
-            <a:endParaRPr lang="en-US"/>
-          </a:p>
-        </p:txBody>
-      </p:sp>
-      <p:sp>
-        <p:nvSpPr>
-          <p:cNvPr id="4" name="Content Placeholder 3"/>
-          <p:cNvSpPr>
-            <a:spLocks noGrp="1"/>
-          </p:cNvSpPr>
-          <p:nvPr>
-            <p:ph sz="half" idx="2"/>
-          </p:nvPr>
-        </p:nvSpPr>
-        <p:spPr/>
-        <p:txBody>
-          <a:bodyPr/>
-          <a:lstStyle/>
-          <a:p>
-            <a:endParaRPr lang="en-US"/>
-          </a:p>
-        </p:txBody>
-      </p:sp>
-      <p:sp>
-        <p:nvSpPr>
-          <p:cNvPr id="5" name="Text Placeholder 4"/>
-          <p:cNvSpPr>
-            <a:spLocks noGrp="1"/>
-          </p:cNvSpPr>
-          <p:nvPr>
-            <p:ph type="body" sz="quarter" idx="3"/>
-          </p:nvPr>
-        </p:nvSpPr>
-        <p:spPr/>
-        <p:txBody>
-          <a:bodyPr/>
-          <a:lstStyle/>
-          <a:p>
-            <a:endParaRPr lang="en-US"/>
-          </a:p>
-        </p:txBody>
-      </p:sp>
-      <p:sp>
-        <p:nvSpPr>
-          <p:cNvPr id="6" name="Content Placeholder 5"/>
-          <p:cNvSpPr>
-            <a:spLocks noGrp="1"/>
-          </p:cNvSpPr>
+            <a:pPr marL="0" indent="0">
+              <a:buNone/>
+            </a:pPr>
+            <a:r>
+              <a:rPr lang="en-US" dirty="0" err="1"/>
+              <a:t>AbstractItem</a:t>
+            </a:r>
+            <a:r>
+              <a:rPr lang="en-US" dirty="0"/>
+              <a:t> class is super-class for all items.</a:t>
+            </a:r>
+          </a:p>
+          <a:p>
+            <a:pPr marL="0" indent="0">
+              <a:buNone/>
+            </a:pPr>
+            <a:r>
+              <a:rPr lang="en-US" dirty="0" err="1"/>
+              <a:t>SuperFactory</a:t>
+            </a:r>
+            <a:r>
+              <a:rPr lang="en-US" dirty="0"/>
+              <a:t> uses sub-factories to generate items. It is not an abstract class or interface.</a:t>
+            </a:r>
+          </a:p>
+        </p:txBody>
+      </p:sp>
+      <p:pic>
+        <p:nvPicPr>
+          <p:cNvPr id="22" name="Content Placeholder 21">
+            <a:extLst>
+              <a:ext uri="{FF2B5EF4-FFF2-40B4-BE49-F238E27FC236}">
+                <a16:creationId xmlns:a16="http://schemas.microsoft.com/office/drawing/2014/main" id="{58D51C67-D58A-99F8-2861-7E62E5A3E4E7}"/>
+              </a:ext>
+            </a:extLst>
+          </p:cNvPr>
+          <p:cNvPicPr>
+            <a:picLocks noGrp="1" noChangeAspect="1"/>
+          </p:cNvPicPr>
           <p:nvPr>
             <p:ph sz="quarter" idx="4"/>
           </p:nvPr>
-        </p:nvSpPr>
-        <p:spPr/>
-        <p:txBody>
-          <a:bodyPr/>
-          <a:lstStyle/>
-          <a:p>
-            <a:endParaRPr lang="en-US"/>
-          </a:p>
-        </p:txBody>
-      </p:sp>
+        </p:nvPicPr>
+        <p:blipFill>
+          <a:blip r:embed="rId2" cstate="print">
+            <a:extLst>
+              <a:ext uri="{28A0092B-C50C-407E-A947-70E740481C1C}">
+                <a14:useLocalDpi xmlns:a14="http://schemas.microsoft.com/office/drawing/2010/main" val="0"/>
+              </a:ext>
+              <a:ext uri="{96DAC541-7B7A-43D3-8B79-37D633B846F1}">
+                <asvg:svgBlip xmlns:asvg="http://schemas.microsoft.com/office/drawing/2016/SVG/main" r:embed="rId3"/>
+              </a:ext>
+            </a:extLst>
+          </a:blip>
+          <a:stretch>
+            <a:fillRect/>
+          </a:stretch>
+        </p:blipFill>
+        <p:spPr>
+          <a:xfrm>
+            <a:off x="4164028" y="1509624"/>
+            <a:ext cx="6921486" cy="4804912"/>
+          </a:xfrm>
+        </p:spPr>
+      </p:pic>
     </p:spTree>
     <p:extLst>
       <p:ext uri="{BB962C8B-B14F-4D97-AF65-F5344CB8AC3E}">
@@ -5234,28 +5232,105 @@
           <a:p>
             <a:r>
               <a:rPr lang="en-US" dirty="0"/>
-              <a:t>Add a Slide Title - 4</a:t>
-            </a:r>
-          </a:p>
-        </p:txBody>
-      </p:sp>
+              <a:t>Catalogue Implementation</a:t>
+            </a:r>
+          </a:p>
+        </p:txBody>
+      </p:sp>
+      <p:sp>
+        <p:nvSpPr>
+          <p:cNvPr id="4" name="Content Placeholder 3"/>
+          <p:cNvSpPr>
+            <a:spLocks noGrp="1"/>
+          </p:cNvSpPr>
+          <p:nvPr>
+            <p:ph sz="half" idx="2"/>
+          </p:nvPr>
+        </p:nvSpPr>
+        <p:spPr>
+          <a:xfrm>
+            <a:off x="1104901" y="1509624"/>
+            <a:ext cx="2923636" cy="4325928"/>
+          </a:xfrm>
+        </p:spPr>
+        <p:txBody>
+          <a:bodyPr/>
+          <a:lstStyle/>
+          <a:p>
+            <a:pPr marL="0" indent="0">
+              <a:buNone/>
+            </a:pPr>
+            <a:r>
+              <a:rPr lang="en-US" dirty="0"/>
+              <a:t>The operations required to maintain a User database, Order database, and Product Catalogue were similar. So an interface served all three.</a:t>
+            </a:r>
+          </a:p>
+          <a:p>
+            <a:pPr marL="0" indent="0">
+              <a:buNone/>
+            </a:pPr>
+            <a:r>
+              <a:rPr lang="en-US" dirty="0"/>
+              <a:t>Each is implemented as a singleton.</a:t>
+            </a:r>
+          </a:p>
+        </p:txBody>
+      </p:sp>
+      <p:pic>
+        <p:nvPicPr>
+          <p:cNvPr id="7" name="Content Placeholder 6">
+            <a:extLst>
+              <a:ext uri="{FF2B5EF4-FFF2-40B4-BE49-F238E27FC236}">
+                <a16:creationId xmlns:a16="http://schemas.microsoft.com/office/drawing/2014/main" id="{6D3C28A3-71E5-D94F-CDF8-8BE2E952181E}"/>
+              </a:ext>
+            </a:extLst>
+          </p:cNvPr>
+          <p:cNvPicPr>
+            <a:picLocks noGrp="1" noChangeAspect="1"/>
+          </p:cNvPicPr>
+          <p:nvPr>
+            <p:ph sz="quarter" idx="4"/>
+          </p:nvPr>
+        </p:nvPicPr>
+        <p:blipFill>
+          <a:blip r:embed="rId2">
+            <a:extLst>
+              <a:ext uri="{28A0092B-C50C-407E-A947-70E740481C1C}">
+                <a14:useLocalDpi xmlns:a14="http://schemas.microsoft.com/office/drawing/2010/main" val="0"/>
+              </a:ext>
+              <a:ext uri="{96DAC541-7B7A-43D3-8B79-37D633B846F1}">
+                <asvg:svgBlip xmlns:asvg="http://schemas.microsoft.com/office/drawing/2016/SVG/main" r:embed="rId3"/>
+              </a:ext>
+            </a:extLst>
+          </a:blip>
+          <a:stretch>
+            <a:fillRect/>
+          </a:stretch>
+        </p:blipFill>
+        <p:spPr>
+          <a:xfrm>
+            <a:off x="4163574" y="1476745"/>
+            <a:ext cx="6922008" cy="4000419"/>
+          </a:xfrm>
+        </p:spPr>
+      </p:pic>
     </p:spTree>
     <p:extLst>
       <p:ext uri="{BB962C8B-B14F-4D97-AF65-F5344CB8AC3E}">
-        <p14:creationId xmlns:p14="http://schemas.microsoft.com/office/powerpoint/2010/main" val="1527004159"/>
+        <p14:creationId xmlns:p14="http://schemas.microsoft.com/office/powerpoint/2010/main" val="1438130022"/>
       </p:ext>
     </p:extLst>
   </p:cSld>
   <p:clrMapOvr>
     <a:masterClrMapping/>
   </p:clrMapOvr>
-  <mc:AlternateContent xmlns:mc="http://schemas.openxmlformats.org/markup-compatibility/2006" xmlns:p14="http://schemas.microsoft.com/office/powerpoint/2010/main">
-    <mc:Choice Requires="p14">
+  <mc:AlternateContent xmlns:mc="http://schemas.openxmlformats.org/markup-compatibility/2006">
+    <mc:Choice xmlns:p14="http://schemas.microsoft.com/office/powerpoint/2010/main" Requires="p14">
       <p:transition spd="med" p14:dur="700">
         <p:fade/>
       </p:transition>
     </mc:Choice>
-    <mc:Fallback xmlns="">
+    <mc:Fallback>
       <p:transition spd="med">
         <p:fade/>
       </p:transition>
@@ -5289,23 +5364,150 @@
           <a:chExt cx="0" cy="0"/>
         </a:xfrm>
       </p:grpSpPr>
+      <p:sp>
+        <p:nvSpPr>
+          <p:cNvPr id="2" name="Title 1"/>
+          <p:cNvSpPr>
+            <a:spLocks noGrp="1"/>
+          </p:cNvSpPr>
+          <p:nvPr>
+            <p:ph type="title"/>
+          </p:nvPr>
+        </p:nvSpPr>
+        <p:spPr/>
+        <p:txBody>
+          <a:bodyPr/>
+          <a:lstStyle/>
+          <a:p>
+            <a:r>
+              <a:rPr lang="en-US" dirty="0"/>
+              <a:t>User, Order, Shopping Cart</a:t>
+            </a:r>
+          </a:p>
+        </p:txBody>
+      </p:sp>
+      <p:sp>
+        <p:nvSpPr>
+          <p:cNvPr id="4" name="Content Placeholder 3"/>
+          <p:cNvSpPr>
+            <a:spLocks noGrp="1"/>
+          </p:cNvSpPr>
+          <p:nvPr>
+            <p:ph sz="half" idx="2"/>
+          </p:nvPr>
+        </p:nvSpPr>
+        <p:spPr>
+          <a:xfrm>
+            <a:off x="1104901" y="1509624"/>
+            <a:ext cx="2923636" cy="4325928"/>
+          </a:xfrm>
+        </p:spPr>
+        <p:txBody>
+          <a:bodyPr>
+            <a:normAutofit lnSpcReduction="10000"/>
+          </a:bodyPr>
+          <a:lstStyle/>
+          <a:p>
+            <a:pPr marL="0" indent="0">
+              <a:buNone/>
+            </a:pPr>
+            <a:r>
+              <a:rPr lang="en-US" dirty="0"/>
+              <a:t>A User class implements a </a:t>
+            </a:r>
+            <a:r>
+              <a:rPr lang="en-US" dirty="0" err="1"/>
+              <a:t>UserInterface</a:t>
+            </a:r>
+            <a:r>
+              <a:rPr lang="en-US" dirty="0"/>
+              <a:t>.</a:t>
+            </a:r>
+          </a:p>
+          <a:p>
+            <a:pPr marL="0" indent="0">
+              <a:buNone/>
+            </a:pPr>
+            <a:r>
+              <a:rPr lang="en-US" dirty="0"/>
+              <a:t>It keeps a list of Order numbers of orders that are associated with that user.</a:t>
+            </a:r>
+          </a:p>
+          <a:p>
+            <a:pPr marL="0" indent="0">
+              <a:buNone/>
+            </a:pPr>
+            <a:r>
+              <a:rPr lang="en-US" dirty="0"/>
+              <a:t>Orders are not generated until a User checks out their purchase.</a:t>
+            </a:r>
+          </a:p>
+          <a:p>
+            <a:pPr marL="0" indent="0">
+              <a:buNone/>
+            </a:pPr>
+            <a:r>
+              <a:rPr lang="en-US" dirty="0"/>
+              <a:t>A Shopping Cart is generated with a User. Only one instance may exist at any one time.</a:t>
+            </a:r>
+          </a:p>
+        </p:txBody>
+      </p:sp>
+      <p:pic>
+        <p:nvPicPr>
+          <p:cNvPr id="7" name="Content Placeholder 6">
+            <a:extLst>
+              <a:ext uri="{FF2B5EF4-FFF2-40B4-BE49-F238E27FC236}">
+                <a16:creationId xmlns:a16="http://schemas.microsoft.com/office/drawing/2014/main" id="{AA5E9D17-7ED3-B296-DD8C-8EEC638D5CEE}"/>
+              </a:ext>
+            </a:extLst>
+          </p:cNvPr>
+          <p:cNvPicPr>
+            <a:picLocks noGrp="1" noChangeAspect="1"/>
+          </p:cNvPicPr>
+          <p:nvPr>
+            <p:ph sz="quarter" idx="4"/>
+          </p:nvPr>
+        </p:nvPicPr>
+        <p:blipFill>
+          <a:blip r:embed="rId2">
+            <a:extLst>
+              <a:ext uri="{28A0092B-C50C-407E-A947-70E740481C1C}">
+                <a14:useLocalDpi xmlns:a14="http://schemas.microsoft.com/office/drawing/2010/main" val="0"/>
+              </a:ext>
+              <a:ext uri="{96DAC541-7B7A-43D3-8B79-37D633B846F1}">
+                <asvg:svgBlip xmlns:asvg="http://schemas.microsoft.com/office/drawing/2016/SVG/main" r:embed="rId3"/>
+              </a:ext>
+            </a:extLst>
+          </a:blip>
+          <a:stretch>
+            <a:fillRect/>
+          </a:stretch>
+        </p:blipFill>
+        <p:spPr>
+          <a:xfrm>
+            <a:off x="5888736" y="1509624"/>
+            <a:ext cx="5262061" cy="4937760"/>
+          </a:xfrm>
+        </p:spPr>
+      </p:pic>
     </p:spTree>
     <p:extLst>
       <p:ext uri="{BB962C8B-B14F-4D97-AF65-F5344CB8AC3E}">
-        <p14:creationId xmlns:p14="http://schemas.microsoft.com/office/powerpoint/2010/main" val="1800380133"/>
+        <p14:creationId xmlns:p14="http://schemas.microsoft.com/office/powerpoint/2010/main" val="4245364414"/>
       </p:ext>
     </p:extLst>
   </p:cSld>
   <p:clrMapOvr>
     <a:masterClrMapping/>
   </p:clrMapOvr>
-  <mc:AlternateContent xmlns:mc="http://schemas.openxmlformats.org/markup-compatibility/2006" xmlns:p14="http://schemas.microsoft.com/office/powerpoint/2010/main">
-    <mc:Choice Requires="p14">
+  <mc:AlternateContent xmlns:mc="http://schemas.openxmlformats.org/markup-compatibility/2006">
+    <mc:Choice xmlns:p14="http://schemas.microsoft.com/office/powerpoint/2010/main" Requires="p14">
       <p:transition spd="med" p14:dur="700">
         <p:fade/>
       </p:transition>
     </mc:Choice>
-    <mc:Fallback xmlns="">
+    <mc:Fallback>
       <p:transition spd="med">
         <p:fade/>
       </p:transition>
@@ -5356,66 +5558,148 @@
           <a:p>
             <a:r>
               <a:rPr lang="en-US" dirty="0"/>
-              <a:t>Add a Slide Title - 5</a:t>
-            </a:r>
-          </a:p>
-        </p:txBody>
-      </p:sp>
-      <p:sp>
-        <p:nvSpPr>
-          <p:cNvPr id="4" name="Text Placeholder 3"/>
-          <p:cNvSpPr>
-            <a:spLocks noGrp="1"/>
-          </p:cNvSpPr>
-          <p:nvPr>
-            <p:ph type="body" sz="half" idx="2"/>
-          </p:nvPr>
-        </p:nvSpPr>
-        <p:spPr/>
-        <p:txBody>
-          <a:bodyPr/>
+              <a:t>Authentication and Payment Processing</a:t>
+            </a:r>
+          </a:p>
+        </p:txBody>
+      </p:sp>
+      <p:sp>
+        <p:nvSpPr>
+          <p:cNvPr id="4" name="Content Placeholder 3"/>
+          <p:cNvSpPr>
+            <a:spLocks noGrp="1"/>
+          </p:cNvSpPr>
+          <p:nvPr>
+            <p:ph sz="half" idx="2"/>
+          </p:nvPr>
+        </p:nvSpPr>
+        <p:spPr>
+          <a:xfrm>
+            <a:off x="1104901" y="1509624"/>
+            <a:ext cx="2514588" cy="4325928"/>
+          </a:xfrm>
+        </p:spPr>
+        <p:txBody>
+          <a:bodyPr>
+            <a:normAutofit/>
+          </a:bodyPr>
           <a:lstStyle/>
           <a:p>
-            <a:endParaRPr lang="en-US"/>
-          </a:p>
-        </p:txBody>
-      </p:sp>
-      <p:sp>
-        <p:nvSpPr>
-          <p:cNvPr id="3" name="Content Placeholder 2"/>
-          <p:cNvSpPr>
-            <a:spLocks noGrp="1"/>
-          </p:cNvSpPr>
-          <p:nvPr>
-            <p:ph idx="1"/>
-          </p:nvPr>
-        </p:nvSpPr>
-        <p:spPr/>
-        <p:txBody>
-          <a:bodyPr/>
-          <a:lstStyle/>
-          <a:p>
-            <a:endParaRPr lang="en-US"/>
-          </a:p>
-        </p:txBody>
-      </p:sp>
+            <a:pPr marL="0" indent="0">
+              <a:buNone/>
+            </a:pPr>
+            <a:r>
+              <a:rPr lang="en-US" sz="1600" dirty="0"/>
+              <a:t>When a user clicks one of the buttons in the GUI, the application calls the </a:t>
+            </a:r>
+            <a:r>
+              <a:rPr lang="en-US" sz="1600" dirty="0" err="1"/>
+              <a:t>AccountHandler</a:t>
+            </a:r>
+            <a:r>
+              <a:rPr lang="en-US" sz="1600" dirty="0"/>
+              <a:t> class.</a:t>
+            </a:r>
+          </a:p>
+          <a:p>
+            <a:pPr marL="0" indent="0">
+              <a:buNone/>
+            </a:pPr>
+            <a:r>
+              <a:rPr lang="en-US" sz="1600" dirty="0"/>
+              <a:t>The </a:t>
+            </a:r>
+            <a:r>
+              <a:rPr lang="en-US" sz="1600" dirty="0" err="1"/>
+              <a:t>AccountHandler</a:t>
+            </a:r>
+            <a:r>
+              <a:rPr lang="en-US" sz="1600" dirty="0"/>
+              <a:t> class handles validating a User’s credentials and creating a new user.</a:t>
+            </a:r>
+          </a:p>
+          <a:p>
+            <a:pPr marL="0" indent="0">
+              <a:buNone/>
+            </a:pPr>
+            <a:r>
+              <a:rPr lang="en-US" sz="1600" dirty="0"/>
+              <a:t>The </a:t>
+            </a:r>
+            <a:r>
+              <a:rPr lang="en-US" sz="1600" dirty="0" err="1"/>
+              <a:t>PaymentProcessor</a:t>
+            </a:r>
+            <a:r>
+              <a:rPr lang="en-US" sz="1600" dirty="0"/>
+              <a:t> validates the User’s credit card information and then the </a:t>
+            </a:r>
+            <a:r>
+              <a:rPr lang="en-US" sz="1600" dirty="0" err="1"/>
+              <a:t>OrderProcessor</a:t>
+            </a:r>
+            <a:r>
+              <a:rPr lang="en-US" sz="1600" dirty="0"/>
+              <a:t> generates the order.</a:t>
+            </a:r>
+          </a:p>
+        </p:txBody>
+      </p:sp>
+      <p:pic>
+        <p:nvPicPr>
+          <p:cNvPr id="15" name="Content Placeholder 14">
+            <a:extLst>
+              <a:ext uri="{FF2B5EF4-FFF2-40B4-BE49-F238E27FC236}">
+                <a16:creationId xmlns:a16="http://schemas.microsoft.com/office/drawing/2014/main" id="{98F0170A-8104-6F1C-16E6-F20B81EB9F41}"/>
+              </a:ext>
+            </a:extLst>
+          </p:cNvPr>
+          <p:cNvPicPr>
+            <a:picLocks noGrp="1" noChangeAspect="1"/>
+          </p:cNvPicPr>
+          <p:nvPr>
+            <p:ph sz="quarter" idx="4"/>
+          </p:nvPr>
+        </p:nvPicPr>
+        <p:blipFill>
+          <a:blip r:embed="rId2">
+            <a:extLst>
+              <a:ext uri="{28A0092B-C50C-407E-A947-70E740481C1C}">
+                <a14:useLocalDpi xmlns:a14="http://schemas.microsoft.com/office/drawing/2010/main" val="0"/>
+              </a:ext>
+              <a:ext uri="{96DAC541-7B7A-43D3-8B79-37D633B846F1}">
+                <asvg:svgBlip xmlns:asvg="http://schemas.microsoft.com/office/drawing/2016/SVG/main" r:embed="rId3"/>
+              </a:ext>
+            </a:extLst>
+          </a:blip>
+          <a:stretch>
+            <a:fillRect/>
+          </a:stretch>
+        </p:blipFill>
+        <p:spPr>
+          <a:xfrm>
+            <a:off x="3881377" y="1509624"/>
+            <a:ext cx="7204206" cy="3528720"/>
+          </a:xfrm>
+        </p:spPr>
+      </p:pic>
     </p:spTree>
     <p:extLst>
       <p:ext uri="{BB962C8B-B14F-4D97-AF65-F5344CB8AC3E}">
-        <p14:creationId xmlns:p14="http://schemas.microsoft.com/office/powerpoint/2010/main" val="3197023440"/>
+        <p14:creationId xmlns:p14="http://schemas.microsoft.com/office/powerpoint/2010/main" val="1367495037"/>
       </p:ext>
     </p:extLst>
   </p:cSld>
   <p:clrMapOvr>
     <a:masterClrMapping/>
   </p:clrMapOvr>
-  <mc:AlternateContent xmlns:mc="http://schemas.openxmlformats.org/markup-compatibility/2006" xmlns:p14="http://schemas.microsoft.com/office/powerpoint/2010/main">
-    <mc:Choice Requires="p14">
+  <mc:AlternateContent xmlns:mc="http://schemas.openxmlformats.org/markup-compatibility/2006">
+    <mc:Choice xmlns:p14="http://schemas.microsoft.com/office/powerpoint/2010/main" Requires="p14">
       <p:transition spd="med" p14:dur="700">
         <p:fade/>
       </p:transition>
     </mc:Choice>
-    <mc:Fallback xmlns="">
+    <mc:Fallback>
       <p:transition spd="med">
         <p:fade/>
       </p:transition>
@@ -5456,7 +5740,7 @@
             <a:spLocks noGrp="1"/>
           </p:cNvSpPr>
           <p:nvPr>
-            <p:ph type="ctrTitle"/>
+            <p:ph type="title"/>
           </p:nvPr>
         </p:nvSpPr>
         <p:spPr/>
@@ -5465,48 +5749,170 @@
           <a:lstStyle/>
           <a:p>
             <a:r>
+              <a:rPr lang="en-US" dirty="0" err="1"/>
+              <a:t>LogWriter</a:t>
+            </a:r>
+            <a:r>
               <a:rPr lang="en-US" dirty="0"/>
-              <a:t>END</a:t>
-            </a:r>
-          </a:p>
-        </p:txBody>
-      </p:sp>
-      <p:sp>
-        <p:nvSpPr>
-          <p:cNvPr id="3" name="Subtitle 2"/>
-          <p:cNvSpPr>
-            <a:spLocks noGrp="1"/>
-          </p:cNvSpPr>
-          <p:nvPr>
-            <p:ph type="subTitle" idx="1"/>
-          </p:nvPr>
-        </p:nvSpPr>
-        <p:spPr/>
+              <a:t> Implementation</a:t>
+            </a:r>
+          </a:p>
+        </p:txBody>
+      </p:sp>
+      <p:sp>
+        <p:nvSpPr>
+          <p:cNvPr id="4" name="Content Placeholder 3"/>
+          <p:cNvSpPr>
+            <a:spLocks noGrp="1"/>
+          </p:cNvSpPr>
+          <p:nvPr>
+            <p:ph sz="half" idx="2"/>
+          </p:nvPr>
+        </p:nvSpPr>
+        <p:spPr>
+          <a:xfrm>
+            <a:off x="1104901" y="1509624"/>
+            <a:ext cx="2923636" cy="4325928"/>
+          </a:xfrm>
+        </p:spPr>
         <p:txBody>
           <a:bodyPr/>
           <a:lstStyle/>
           <a:p>
+            <a:pPr marL="0" indent="0">
+              <a:buNone/>
+            </a:pPr>
             <a:r>
               <a:rPr lang="en-US" dirty="0"/>
-              <a:t>William Berthouex</a:t>
-            </a:r>
-          </a:p>
-          <a:p>
+              <a:t>The </a:t>
+            </a:r>
             <a:r>
               <a:rPr lang="en-US" dirty="0" err="1"/>
-              <a:t>Github</a:t>
+              <a:t>LogWriter</a:t>
             </a:r>
             <a:r>
               <a:rPr lang="en-US" dirty="0"/>
-              <a:t> link: </a:t>
-            </a:r>
-            <a:r>
-              <a:rPr lang="en-US" dirty="0">
-                <a:hlinkClick r:id="rId2"/>
-              </a:rPr>
-              <a:t>https://github.com/StateControlled/SE450_Final_Project</a:t>
-            </a:r>
-            <a:endParaRPr lang="en-US" dirty="0"/>
+              <a:t> logs events to a log file.</a:t>
+            </a:r>
+          </a:p>
+          <a:p>
+            <a:pPr marL="0" indent="0">
+              <a:buNone/>
+            </a:pPr>
+            <a:r>
+              <a:rPr lang="en-US" dirty="0"/>
+              <a:t>Subsequent instances of the application will use the same log file.</a:t>
+            </a:r>
+          </a:p>
+        </p:txBody>
+      </p:sp>
+      <p:pic>
+        <p:nvPicPr>
+          <p:cNvPr id="7" name="Content Placeholder 6">
+            <a:extLst>
+              <a:ext uri="{FF2B5EF4-FFF2-40B4-BE49-F238E27FC236}">
+                <a16:creationId xmlns:a16="http://schemas.microsoft.com/office/drawing/2014/main" id="{24D6B984-0C92-0F71-8B02-8E22C42771A1}"/>
+              </a:ext>
+            </a:extLst>
+          </p:cNvPr>
+          <p:cNvPicPr>
+            <a:picLocks noGrp="1" noChangeAspect="1"/>
+          </p:cNvPicPr>
+          <p:nvPr>
+            <p:ph sz="quarter" idx="4"/>
+          </p:nvPr>
+        </p:nvPicPr>
+        <p:blipFill>
+          <a:blip r:embed="rId2">
+            <a:extLst>
+              <a:ext uri="{28A0092B-C50C-407E-A947-70E740481C1C}">
+                <a14:useLocalDpi xmlns:a14="http://schemas.microsoft.com/office/drawing/2010/main" val="0"/>
+              </a:ext>
+              <a:ext uri="{96DAC541-7B7A-43D3-8B79-37D633B846F1}">
+                <asvg:svgBlip xmlns:asvg="http://schemas.microsoft.com/office/drawing/2016/SVG/main" r:embed="rId3"/>
+              </a:ext>
+            </a:extLst>
+          </a:blip>
+          <a:stretch>
+            <a:fillRect/>
+          </a:stretch>
+        </p:blipFill>
+        <p:spPr>
+          <a:xfrm>
+            <a:off x="4461923" y="1509624"/>
+            <a:ext cx="6623660" cy="3450303"/>
+          </a:xfrm>
+        </p:spPr>
+      </p:pic>
+    </p:spTree>
+    <p:extLst>
+      <p:ext uri="{BB962C8B-B14F-4D97-AF65-F5344CB8AC3E}">
+        <p14:creationId xmlns:p14="http://schemas.microsoft.com/office/powerpoint/2010/main" val="3916905494"/>
+      </p:ext>
+    </p:extLst>
+  </p:cSld>
+  <p:clrMapOvr>
+    <a:masterClrMapping/>
+  </p:clrMapOvr>
+  <mc:AlternateContent xmlns:mc="http://schemas.openxmlformats.org/markup-compatibility/2006">
+    <mc:Choice xmlns:p14="http://schemas.microsoft.com/office/powerpoint/2010/main" Requires="p14">
+      <p:transition spd="med" p14:dur="700">
+        <p:fade/>
+      </p:transition>
+    </mc:Choice>
+    <mc:Fallback>
+      <p:transition spd="med">
+        <p:fade/>
+      </p:transition>
+    </mc:Fallback>
+  </mc:AlternateContent>
+</p:sld>
+</file>
+
+<file path=ppt/slides/slide15.xml><?xml version="1.0" encoding="utf-8"?>
+<p:sld xmlns:a="http://schemas.openxmlformats.org/drawingml/2006/main" xmlns:r="http://schemas.openxmlformats.org/officeDocument/2006/relationships" xmlns:p="http://schemas.openxmlformats.org/presentationml/2006/main">
+  <p:cSld>
+    <p:bg>
+      <p:bgPr>
+        <a:solidFill>
+          <a:schemeClr val="bg1"/>
+        </a:solidFill>
+        <a:effectLst/>
+      </p:bgPr>
+    </p:bg>
+    <p:spTree>
+      <p:nvGrpSpPr>
+        <p:cNvPr id="1" name=""/>
+        <p:cNvGrpSpPr/>
+        <p:nvPr/>
+      </p:nvGrpSpPr>
+      <p:grpSpPr>
+        <a:xfrm>
+          <a:off x="0" y="0"/>
+          <a:ext cx="0" cy="0"/>
+          <a:chOff x="0" y="0"/>
+          <a:chExt cx="0" cy="0"/>
+        </a:xfrm>
+      </p:grpSpPr>
+      <p:sp>
+        <p:nvSpPr>
+          <p:cNvPr id="2" name="Title 1"/>
+          <p:cNvSpPr>
+            <a:spLocks noGrp="1"/>
+          </p:cNvSpPr>
+          <p:nvPr>
+            <p:ph type="ctrTitle"/>
+          </p:nvPr>
+        </p:nvSpPr>
+        <p:spPr/>
+        <p:txBody>
+          <a:bodyPr/>
+          <a:lstStyle/>
+          <a:p>
+            <a:r>
+              <a:rPr lang="en-US" dirty="0"/>
+              <a:t>Application Demonstration</a:t>
+            </a:r>
           </a:p>
         </p:txBody>
       </p:sp>
@@ -7312,132 +7718,6 @@
 </file>
 
 <file path=customXml/item1.xml><?xml version="1.0" encoding="utf-8"?>
-<p:properties xmlns:p="http://schemas.microsoft.com/office/2006/metadata/properties" xmlns:xsi="http://www.w3.org/2001/XMLSchema-instance" xmlns:pc="http://schemas.microsoft.com/office/infopath/2007/PartnerControls">
-  <documentManagement>
-    <APDescription xmlns="4873beb7-5857-4685-be1f-d57550cc96cc" xsi:nil="true"/>
-    <AssetExpire xmlns="4873beb7-5857-4685-be1f-d57550cc96cc">2029-01-01T08:00:00+00:00</AssetExpire>
-    <CampaignTagsTaxHTField0 xmlns="4873beb7-5857-4685-be1f-d57550cc96cc">
-      <Terms xmlns="http://schemas.microsoft.com/office/infopath/2007/PartnerControls"/>
-    </CampaignTagsTaxHTField0>
-    <IntlLangReviewDate xmlns="4873beb7-5857-4685-be1f-d57550cc96cc" xsi:nil="true"/>
-    <TPFriendlyName xmlns="4873beb7-5857-4685-be1f-d57550cc96cc" xsi:nil="true"/>
-    <IntlLangReview xmlns="4873beb7-5857-4685-be1f-d57550cc96cc">false</IntlLangReview>
-    <LocLastLocAttemptVersionLookup xmlns="4873beb7-5857-4685-be1f-d57550cc96cc">855024</LocLastLocAttemptVersionLookup>
-    <PolicheckWords xmlns="4873beb7-5857-4685-be1f-d57550cc96cc" xsi:nil="true"/>
-    <SubmitterId xmlns="4873beb7-5857-4685-be1f-d57550cc96cc" xsi:nil="true"/>
-    <AcquiredFrom xmlns="4873beb7-5857-4685-be1f-d57550cc96cc">Internal MS</AcquiredFrom>
-    <EditorialStatus xmlns="4873beb7-5857-4685-be1f-d57550cc96cc">Complete</EditorialStatus>
-    <Markets xmlns="4873beb7-5857-4685-be1f-d57550cc96cc"/>
-    <OriginAsset xmlns="4873beb7-5857-4685-be1f-d57550cc96cc" xsi:nil="true"/>
-    <AssetStart xmlns="4873beb7-5857-4685-be1f-d57550cc96cc">2012-08-31T08:50:00+00:00</AssetStart>
-    <FriendlyTitle xmlns="4873beb7-5857-4685-be1f-d57550cc96cc" xsi:nil="true"/>
-    <MarketSpecific xmlns="4873beb7-5857-4685-be1f-d57550cc96cc">false</MarketSpecific>
-    <TPNamespace xmlns="4873beb7-5857-4685-be1f-d57550cc96cc" xsi:nil="true"/>
-    <PublishStatusLookup xmlns="4873beb7-5857-4685-be1f-d57550cc96cc">
-      <Value>1616423</Value>
-    </PublishStatusLookup>
-    <APAuthor xmlns="4873beb7-5857-4685-be1f-d57550cc96cc">
-      <UserInfo>
-        <DisplayName>REDMOND\kristaa</DisplayName>
-        <AccountId>136</AccountId>
-        <AccountType/>
-      </UserInfo>
-    </APAuthor>
-    <TPCommandLine xmlns="4873beb7-5857-4685-be1f-d57550cc96cc" xsi:nil="true"/>
-    <IntlLangReviewer xmlns="4873beb7-5857-4685-be1f-d57550cc96cc" xsi:nil="true"/>
-    <OpenTemplate xmlns="4873beb7-5857-4685-be1f-d57550cc96cc">true</OpenTemplate>
-    <CSXSubmissionDate xmlns="4873beb7-5857-4685-be1f-d57550cc96cc" xsi:nil="true"/>
-    <TaxCatchAll xmlns="4873beb7-5857-4685-be1f-d57550cc96cc"/>
-    <Manager xmlns="4873beb7-5857-4685-be1f-d57550cc96cc" xsi:nil="true"/>
-    <NumericId xmlns="4873beb7-5857-4685-be1f-d57550cc96cc" xsi:nil="true"/>
-    <ParentAssetId xmlns="4873beb7-5857-4685-be1f-d57550cc96cc" xsi:nil="true"/>
-    <OriginalSourceMarket xmlns="4873beb7-5857-4685-be1f-d57550cc96cc" xsi:nil="true"/>
-    <ApprovalStatus xmlns="4873beb7-5857-4685-be1f-d57550cc96cc">InProgress</ApprovalStatus>
-    <TPComponent xmlns="4873beb7-5857-4685-be1f-d57550cc96cc" xsi:nil="true"/>
-    <EditorialTags xmlns="4873beb7-5857-4685-be1f-d57550cc96cc" xsi:nil="true"/>
-    <TPExecutable xmlns="4873beb7-5857-4685-be1f-d57550cc96cc" xsi:nil="true"/>
-    <TPLaunchHelpLink xmlns="4873beb7-5857-4685-be1f-d57550cc96cc" xsi:nil="true"/>
-    <LocComments xmlns="4873beb7-5857-4685-be1f-d57550cc96cc" xsi:nil="true"/>
-    <LocRecommendedHandoff xmlns="4873beb7-5857-4685-be1f-d57550cc96cc" xsi:nil="true"/>
-    <SourceTitle xmlns="4873beb7-5857-4685-be1f-d57550cc96cc" xsi:nil="true"/>
-    <CSXUpdate xmlns="4873beb7-5857-4685-be1f-d57550cc96cc">false</CSXUpdate>
-    <IntlLocPriority xmlns="4873beb7-5857-4685-be1f-d57550cc96cc" xsi:nil="true"/>
-    <UAProjectedTotalWords xmlns="4873beb7-5857-4685-be1f-d57550cc96cc" xsi:nil="true"/>
-    <AssetType xmlns="4873beb7-5857-4685-be1f-d57550cc96cc">TP</AssetType>
-    <MachineTranslated xmlns="4873beb7-5857-4685-be1f-d57550cc96cc">false</MachineTranslated>
-    <OutputCachingOn xmlns="4873beb7-5857-4685-be1f-d57550cc96cc">false</OutputCachingOn>
-    <TemplateStatus xmlns="4873beb7-5857-4685-be1f-d57550cc96cc">Complete</TemplateStatus>
-    <IsSearchable xmlns="4873beb7-5857-4685-be1f-d57550cc96cc">true</IsSearchable>
-    <ContentItem xmlns="4873beb7-5857-4685-be1f-d57550cc96cc" xsi:nil="true"/>
-    <HandoffToMSDN xmlns="4873beb7-5857-4685-be1f-d57550cc96cc" xsi:nil="true"/>
-    <ShowIn xmlns="4873beb7-5857-4685-be1f-d57550cc96cc">Show everywhere</ShowIn>
-    <ThumbnailAssetId xmlns="4873beb7-5857-4685-be1f-d57550cc96cc" xsi:nil="true"/>
-    <UALocComments xmlns="4873beb7-5857-4685-be1f-d57550cc96cc" xsi:nil="true"/>
-    <UALocRecommendation xmlns="4873beb7-5857-4685-be1f-d57550cc96cc">Localize</UALocRecommendation>
-    <LastModifiedDateTime xmlns="4873beb7-5857-4685-be1f-d57550cc96cc" xsi:nil="true"/>
-    <LegacyData xmlns="4873beb7-5857-4685-be1f-d57550cc96cc" xsi:nil="true"/>
-    <LocManualTestRequired xmlns="4873beb7-5857-4685-be1f-d57550cc96cc">false</LocManualTestRequired>
-    <LocMarketGroupTiers2 xmlns="4873beb7-5857-4685-be1f-d57550cc96cc" xsi:nil="true"/>
-    <ClipArtFilename xmlns="4873beb7-5857-4685-be1f-d57550cc96cc" xsi:nil="true"/>
-    <TPApplication xmlns="4873beb7-5857-4685-be1f-d57550cc96cc" xsi:nil="true"/>
-    <CSXHash xmlns="4873beb7-5857-4685-be1f-d57550cc96cc" xsi:nil="true"/>
-    <DirectSourceMarket xmlns="4873beb7-5857-4685-be1f-d57550cc96cc" xsi:nil="true"/>
-    <PrimaryImageGen xmlns="4873beb7-5857-4685-be1f-d57550cc96cc">true</PrimaryImageGen>
-    <PlannedPubDate xmlns="4873beb7-5857-4685-be1f-d57550cc96cc" xsi:nil="true"/>
-    <CSXSubmissionMarket xmlns="4873beb7-5857-4685-be1f-d57550cc96cc" xsi:nil="true"/>
-    <Downloads xmlns="4873beb7-5857-4685-be1f-d57550cc96cc">0</Downloads>
-    <ArtSampleDocs xmlns="4873beb7-5857-4685-be1f-d57550cc96cc" xsi:nil="true"/>
-    <TrustLevel xmlns="4873beb7-5857-4685-be1f-d57550cc96cc">1 Microsoft Managed Content</TrustLevel>
-    <BlockPublish xmlns="4873beb7-5857-4685-be1f-d57550cc96cc">false</BlockPublish>
-    <TPLaunchHelpLinkType xmlns="4873beb7-5857-4685-be1f-d57550cc96cc">Template</TPLaunchHelpLinkType>
-    <LocalizationTagsTaxHTField0 xmlns="4873beb7-5857-4685-be1f-d57550cc96cc">
-      <Terms xmlns="http://schemas.microsoft.com/office/infopath/2007/PartnerControls"/>
-    </LocalizationTagsTaxHTField0>
-    <BusinessGroup xmlns="4873beb7-5857-4685-be1f-d57550cc96cc" xsi:nil="true"/>
-    <Providers xmlns="4873beb7-5857-4685-be1f-d57550cc96cc" xsi:nil="true"/>
-    <TemplateTemplateType xmlns="4873beb7-5857-4685-be1f-d57550cc96cc">PowerPoint Presentation Template</TemplateTemplateType>
-    <TimesCloned xmlns="4873beb7-5857-4685-be1f-d57550cc96cc" xsi:nil="true"/>
-    <TPAppVersion xmlns="4873beb7-5857-4685-be1f-d57550cc96cc" xsi:nil="true"/>
-    <VoteCount xmlns="4873beb7-5857-4685-be1f-d57550cc96cc" xsi:nil="true"/>
-    <AverageRating xmlns="4873beb7-5857-4685-be1f-d57550cc96cc" xsi:nil="true"/>
-    <FeatureTagsTaxHTField0 xmlns="4873beb7-5857-4685-be1f-d57550cc96cc">
-      <Terms xmlns="http://schemas.microsoft.com/office/infopath/2007/PartnerControls"/>
-    </FeatureTagsTaxHTField0>
-    <Provider xmlns="4873beb7-5857-4685-be1f-d57550cc96cc" xsi:nil="true"/>
-    <UACurrentWords xmlns="4873beb7-5857-4685-be1f-d57550cc96cc" xsi:nil="true"/>
-    <AssetId xmlns="4873beb7-5857-4685-be1f-d57550cc96cc">TP103431361</AssetId>
-    <TPClientViewer xmlns="4873beb7-5857-4685-be1f-d57550cc96cc" xsi:nil="true"/>
-    <DSATActionTaken xmlns="4873beb7-5857-4685-be1f-d57550cc96cc" xsi:nil="true"/>
-    <APEditor xmlns="4873beb7-5857-4685-be1f-d57550cc96cc">
-      <UserInfo>
-        <DisplayName/>
-        <AccountId xsi:nil="true"/>
-        <AccountType/>
-      </UserInfo>
-    </APEditor>
-    <TPInstallLocation xmlns="4873beb7-5857-4685-be1f-d57550cc96cc" xsi:nil="true"/>
-    <OOCacheId xmlns="4873beb7-5857-4685-be1f-d57550cc96cc" xsi:nil="true"/>
-    <IsDeleted xmlns="4873beb7-5857-4685-be1f-d57550cc96cc">false</IsDeleted>
-    <PublishTargets xmlns="4873beb7-5857-4685-be1f-d57550cc96cc">OfficeOnlineVNext</PublishTargets>
-    <ApprovalLog xmlns="4873beb7-5857-4685-be1f-d57550cc96cc" xsi:nil="true"/>
-    <BugNumber xmlns="4873beb7-5857-4685-be1f-d57550cc96cc" xsi:nil="true"/>
-    <CrawlForDependencies xmlns="4873beb7-5857-4685-be1f-d57550cc96cc">false</CrawlForDependencies>
-    <InternalTagsTaxHTField0 xmlns="4873beb7-5857-4685-be1f-d57550cc96cc">
-      <Terms xmlns="http://schemas.microsoft.com/office/infopath/2007/PartnerControls"/>
-    </InternalTagsTaxHTField0>
-    <LastHandOff xmlns="4873beb7-5857-4685-be1f-d57550cc96cc" xsi:nil="true"/>
-    <Milestone xmlns="4873beb7-5857-4685-be1f-d57550cc96cc" xsi:nil="true"/>
-    <OriginalRelease xmlns="4873beb7-5857-4685-be1f-d57550cc96cc">15</OriginalRelease>
-    <RecommendationsModifier xmlns="4873beb7-5857-4685-be1f-d57550cc96cc" xsi:nil="true"/>
-    <ScenarioTagsTaxHTField0 xmlns="4873beb7-5857-4685-be1f-d57550cc96cc">
-      <Terms xmlns="http://schemas.microsoft.com/office/infopath/2007/PartnerControls"/>
-    </ScenarioTagsTaxHTField0>
-    <UANotes xmlns="4873beb7-5857-4685-be1f-d57550cc96cc" xsi:nil="true"/>
-  </documentManagement>
-</p:properties>
-</file>
-
-<file path=customXml/item2.xml><?xml version="1.0" encoding="utf-8"?>
 <ct:contentTypeSchema xmlns:ct="http://schemas.microsoft.com/office/2006/metadata/contentType" xmlns:ma="http://schemas.microsoft.com/office/2006/metadata/properties/metaAttributes" ct:_="" ma:_="" ma:contentTypeName="TemplateFile" ma:contentTypeID="0x0101006EDDDB5EE6D98C44930B742096920B300400F5B6D36B3EF94B4E9A635CDF2A18F5B8" ma:contentTypeVersion="72" ma:contentTypeDescription="Create a new document." ma:contentTypeScope="" ma:versionID="a23e56308344d904b51738559c3d67c9">
   <xsd:schema xmlns:xsd="http://www.w3.org/2001/XMLSchema" xmlns:xs="http://www.w3.org/2001/XMLSchema" xmlns:p="http://schemas.microsoft.com/office/2006/metadata/properties" xmlns:ns2="4873beb7-5857-4685-be1f-d57550cc96cc" targetNamespace="http://schemas.microsoft.com/office/2006/metadata/properties" ma:root="true" ma:fieldsID="cd0908cc4600e77bf5da051303e00c8d" ns2:_="">
     <xsd:import namespace="4873beb7-5857-4685-be1f-d57550cc96cc"/>
@@ -8477,6 +8757,132 @@
 </ct:contentTypeSchema>
 </file>
 
+<file path=customXml/item2.xml><?xml version="1.0" encoding="utf-8"?>
+<p:properties xmlns:p="http://schemas.microsoft.com/office/2006/metadata/properties" xmlns:xsi="http://www.w3.org/2001/XMLSchema-instance" xmlns:pc="http://schemas.microsoft.com/office/infopath/2007/PartnerControls">
+  <documentManagement>
+    <APDescription xmlns="4873beb7-5857-4685-be1f-d57550cc96cc" xsi:nil="true"/>
+    <AssetExpire xmlns="4873beb7-5857-4685-be1f-d57550cc96cc">2029-01-01T08:00:00+00:00</AssetExpire>
+    <CampaignTagsTaxHTField0 xmlns="4873beb7-5857-4685-be1f-d57550cc96cc">
+      <Terms xmlns="http://schemas.microsoft.com/office/infopath/2007/PartnerControls"/>
+    </CampaignTagsTaxHTField0>
+    <IntlLangReviewDate xmlns="4873beb7-5857-4685-be1f-d57550cc96cc" xsi:nil="true"/>
+    <TPFriendlyName xmlns="4873beb7-5857-4685-be1f-d57550cc96cc" xsi:nil="true"/>
+    <IntlLangReview xmlns="4873beb7-5857-4685-be1f-d57550cc96cc">false</IntlLangReview>
+    <LocLastLocAttemptVersionLookup xmlns="4873beb7-5857-4685-be1f-d57550cc96cc">855024</LocLastLocAttemptVersionLookup>
+    <PolicheckWords xmlns="4873beb7-5857-4685-be1f-d57550cc96cc" xsi:nil="true"/>
+    <SubmitterId xmlns="4873beb7-5857-4685-be1f-d57550cc96cc" xsi:nil="true"/>
+    <AcquiredFrom xmlns="4873beb7-5857-4685-be1f-d57550cc96cc">Internal MS</AcquiredFrom>
+    <EditorialStatus xmlns="4873beb7-5857-4685-be1f-d57550cc96cc">Complete</EditorialStatus>
+    <Markets xmlns="4873beb7-5857-4685-be1f-d57550cc96cc"/>
+    <OriginAsset xmlns="4873beb7-5857-4685-be1f-d57550cc96cc" xsi:nil="true"/>
+    <AssetStart xmlns="4873beb7-5857-4685-be1f-d57550cc96cc">2012-08-31T08:50:00+00:00</AssetStart>
+    <FriendlyTitle xmlns="4873beb7-5857-4685-be1f-d57550cc96cc" xsi:nil="true"/>
+    <MarketSpecific xmlns="4873beb7-5857-4685-be1f-d57550cc96cc">false</MarketSpecific>
+    <TPNamespace xmlns="4873beb7-5857-4685-be1f-d57550cc96cc" xsi:nil="true"/>
+    <PublishStatusLookup xmlns="4873beb7-5857-4685-be1f-d57550cc96cc">
+      <Value>1616423</Value>
+    </PublishStatusLookup>
+    <APAuthor xmlns="4873beb7-5857-4685-be1f-d57550cc96cc">
+      <UserInfo>
+        <DisplayName>REDMOND\kristaa</DisplayName>
+        <AccountId>136</AccountId>
+        <AccountType/>
+      </UserInfo>
+    </APAuthor>
+    <TPCommandLine xmlns="4873beb7-5857-4685-be1f-d57550cc96cc" xsi:nil="true"/>
+    <IntlLangReviewer xmlns="4873beb7-5857-4685-be1f-d57550cc96cc" xsi:nil="true"/>
+    <OpenTemplate xmlns="4873beb7-5857-4685-be1f-d57550cc96cc">true</OpenTemplate>
+    <CSXSubmissionDate xmlns="4873beb7-5857-4685-be1f-d57550cc96cc" xsi:nil="true"/>
+    <TaxCatchAll xmlns="4873beb7-5857-4685-be1f-d57550cc96cc"/>
+    <Manager xmlns="4873beb7-5857-4685-be1f-d57550cc96cc" xsi:nil="true"/>
+    <NumericId xmlns="4873beb7-5857-4685-be1f-d57550cc96cc" xsi:nil="true"/>
+    <ParentAssetId xmlns="4873beb7-5857-4685-be1f-d57550cc96cc" xsi:nil="true"/>
+    <OriginalSourceMarket xmlns="4873beb7-5857-4685-be1f-d57550cc96cc" xsi:nil="true"/>
+    <ApprovalStatus xmlns="4873beb7-5857-4685-be1f-d57550cc96cc">InProgress</ApprovalStatus>
+    <TPComponent xmlns="4873beb7-5857-4685-be1f-d57550cc96cc" xsi:nil="true"/>
+    <EditorialTags xmlns="4873beb7-5857-4685-be1f-d57550cc96cc" xsi:nil="true"/>
+    <TPExecutable xmlns="4873beb7-5857-4685-be1f-d57550cc96cc" xsi:nil="true"/>
+    <TPLaunchHelpLink xmlns="4873beb7-5857-4685-be1f-d57550cc96cc" xsi:nil="true"/>
+    <LocComments xmlns="4873beb7-5857-4685-be1f-d57550cc96cc" xsi:nil="true"/>
+    <LocRecommendedHandoff xmlns="4873beb7-5857-4685-be1f-d57550cc96cc" xsi:nil="true"/>
+    <SourceTitle xmlns="4873beb7-5857-4685-be1f-d57550cc96cc" xsi:nil="true"/>
+    <CSXUpdate xmlns="4873beb7-5857-4685-be1f-d57550cc96cc">false</CSXUpdate>
+    <IntlLocPriority xmlns="4873beb7-5857-4685-be1f-d57550cc96cc" xsi:nil="true"/>
+    <UAProjectedTotalWords xmlns="4873beb7-5857-4685-be1f-d57550cc96cc" xsi:nil="true"/>
+    <AssetType xmlns="4873beb7-5857-4685-be1f-d57550cc96cc">TP</AssetType>
+    <MachineTranslated xmlns="4873beb7-5857-4685-be1f-d57550cc96cc">false</MachineTranslated>
+    <OutputCachingOn xmlns="4873beb7-5857-4685-be1f-d57550cc96cc">false</OutputCachingOn>
+    <TemplateStatus xmlns="4873beb7-5857-4685-be1f-d57550cc96cc">Complete</TemplateStatus>
+    <IsSearchable xmlns="4873beb7-5857-4685-be1f-d57550cc96cc">true</IsSearchable>
+    <ContentItem xmlns="4873beb7-5857-4685-be1f-d57550cc96cc" xsi:nil="true"/>
+    <HandoffToMSDN xmlns="4873beb7-5857-4685-be1f-d57550cc96cc" xsi:nil="true"/>
+    <ShowIn xmlns="4873beb7-5857-4685-be1f-d57550cc96cc">Show everywhere</ShowIn>
+    <ThumbnailAssetId xmlns="4873beb7-5857-4685-be1f-d57550cc96cc" xsi:nil="true"/>
+    <UALocComments xmlns="4873beb7-5857-4685-be1f-d57550cc96cc" xsi:nil="true"/>
+    <UALocRecommendation xmlns="4873beb7-5857-4685-be1f-d57550cc96cc">Localize</UALocRecommendation>
+    <LastModifiedDateTime xmlns="4873beb7-5857-4685-be1f-d57550cc96cc" xsi:nil="true"/>
+    <LegacyData xmlns="4873beb7-5857-4685-be1f-d57550cc96cc" xsi:nil="true"/>
+    <LocManualTestRequired xmlns="4873beb7-5857-4685-be1f-d57550cc96cc">false</LocManualTestRequired>
+    <LocMarketGroupTiers2 xmlns="4873beb7-5857-4685-be1f-d57550cc96cc" xsi:nil="true"/>
+    <ClipArtFilename xmlns="4873beb7-5857-4685-be1f-d57550cc96cc" xsi:nil="true"/>
+    <TPApplication xmlns="4873beb7-5857-4685-be1f-d57550cc96cc" xsi:nil="true"/>
+    <CSXHash xmlns="4873beb7-5857-4685-be1f-d57550cc96cc" xsi:nil="true"/>
+    <DirectSourceMarket xmlns="4873beb7-5857-4685-be1f-d57550cc96cc" xsi:nil="true"/>
+    <PrimaryImageGen xmlns="4873beb7-5857-4685-be1f-d57550cc96cc">true</PrimaryImageGen>
+    <PlannedPubDate xmlns="4873beb7-5857-4685-be1f-d57550cc96cc" xsi:nil="true"/>
+    <CSXSubmissionMarket xmlns="4873beb7-5857-4685-be1f-d57550cc96cc" xsi:nil="true"/>
+    <Downloads xmlns="4873beb7-5857-4685-be1f-d57550cc96cc">0</Downloads>
+    <ArtSampleDocs xmlns="4873beb7-5857-4685-be1f-d57550cc96cc" xsi:nil="true"/>
+    <TrustLevel xmlns="4873beb7-5857-4685-be1f-d57550cc96cc">1 Microsoft Managed Content</TrustLevel>
+    <BlockPublish xmlns="4873beb7-5857-4685-be1f-d57550cc96cc">false</BlockPublish>
+    <TPLaunchHelpLinkType xmlns="4873beb7-5857-4685-be1f-d57550cc96cc">Template</TPLaunchHelpLinkType>
+    <LocalizationTagsTaxHTField0 xmlns="4873beb7-5857-4685-be1f-d57550cc96cc">
+      <Terms xmlns="http://schemas.microsoft.com/office/infopath/2007/PartnerControls"/>
+    </LocalizationTagsTaxHTField0>
+    <BusinessGroup xmlns="4873beb7-5857-4685-be1f-d57550cc96cc" xsi:nil="true"/>
+    <Providers xmlns="4873beb7-5857-4685-be1f-d57550cc96cc" xsi:nil="true"/>
+    <TemplateTemplateType xmlns="4873beb7-5857-4685-be1f-d57550cc96cc">PowerPoint Presentation Template</TemplateTemplateType>
+    <TimesCloned xmlns="4873beb7-5857-4685-be1f-d57550cc96cc" xsi:nil="true"/>
+    <TPAppVersion xmlns="4873beb7-5857-4685-be1f-d57550cc96cc" xsi:nil="true"/>
+    <VoteCount xmlns="4873beb7-5857-4685-be1f-d57550cc96cc" xsi:nil="true"/>
+    <AverageRating xmlns="4873beb7-5857-4685-be1f-d57550cc96cc" xsi:nil="true"/>
+    <FeatureTagsTaxHTField0 xmlns="4873beb7-5857-4685-be1f-d57550cc96cc">
+      <Terms xmlns="http://schemas.microsoft.com/office/infopath/2007/PartnerControls"/>
+    </FeatureTagsTaxHTField0>
+    <Provider xmlns="4873beb7-5857-4685-be1f-d57550cc96cc" xsi:nil="true"/>
+    <UACurrentWords xmlns="4873beb7-5857-4685-be1f-d57550cc96cc" xsi:nil="true"/>
+    <AssetId xmlns="4873beb7-5857-4685-be1f-d57550cc96cc">TP103431361</AssetId>
+    <TPClientViewer xmlns="4873beb7-5857-4685-be1f-d57550cc96cc" xsi:nil="true"/>
+    <DSATActionTaken xmlns="4873beb7-5857-4685-be1f-d57550cc96cc" xsi:nil="true"/>
+    <APEditor xmlns="4873beb7-5857-4685-be1f-d57550cc96cc">
+      <UserInfo>
+        <DisplayName/>
+        <AccountId xsi:nil="true"/>
+        <AccountType/>
+      </UserInfo>
+    </APEditor>
+    <TPInstallLocation xmlns="4873beb7-5857-4685-be1f-d57550cc96cc" xsi:nil="true"/>
+    <OOCacheId xmlns="4873beb7-5857-4685-be1f-d57550cc96cc" xsi:nil="true"/>
+    <IsDeleted xmlns="4873beb7-5857-4685-be1f-d57550cc96cc">false</IsDeleted>
+    <PublishTargets xmlns="4873beb7-5857-4685-be1f-d57550cc96cc">OfficeOnlineVNext</PublishTargets>
+    <ApprovalLog xmlns="4873beb7-5857-4685-be1f-d57550cc96cc" xsi:nil="true"/>
+    <BugNumber xmlns="4873beb7-5857-4685-be1f-d57550cc96cc" xsi:nil="true"/>
+    <CrawlForDependencies xmlns="4873beb7-5857-4685-be1f-d57550cc96cc">false</CrawlForDependencies>
+    <InternalTagsTaxHTField0 xmlns="4873beb7-5857-4685-be1f-d57550cc96cc">
+      <Terms xmlns="http://schemas.microsoft.com/office/infopath/2007/PartnerControls"/>
+    </InternalTagsTaxHTField0>
+    <LastHandOff xmlns="4873beb7-5857-4685-be1f-d57550cc96cc" xsi:nil="true"/>
+    <Milestone xmlns="4873beb7-5857-4685-be1f-d57550cc96cc" xsi:nil="true"/>
+    <OriginalRelease xmlns="4873beb7-5857-4685-be1f-d57550cc96cc">15</OriginalRelease>
+    <RecommendationsModifier xmlns="4873beb7-5857-4685-be1f-d57550cc96cc" xsi:nil="true"/>
+    <ScenarioTagsTaxHTField0 xmlns="4873beb7-5857-4685-be1f-d57550cc96cc">
+      <Terms xmlns="http://schemas.microsoft.com/office/infopath/2007/PartnerControls"/>
+    </ScenarioTagsTaxHTField0>
+    <UANotes xmlns="4873beb7-5857-4685-be1f-d57550cc96cc" xsi:nil="true"/>
+  </documentManagement>
+</p:properties>
+</file>
+
 <file path=customXml/item3.xml><?xml version="1.0" encoding="utf-8"?>
 <?mso-contentType ?>
 <FormTemplates xmlns="http://schemas.microsoft.com/sharepoint/v3/contenttype/forms">
@@ -8487,22 +8893,6 @@
 </file>
 
 <file path=customXml/itemProps1.xml><?xml version="1.0" encoding="utf-8"?>
-<ds:datastoreItem xmlns:ds="http://schemas.openxmlformats.org/officeDocument/2006/customXml" ds:itemID="{8CDDBB83-77C1-4099-A0AA-289882E745E2}">
-  <ds:schemaRefs>
-    <ds:schemaRef ds:uri="http://purl.org/dc/elements/1.1/"/>
-    <ds:schemaRef ds:uri="http://schemas.microsoft.com/office/2006/metadata/properties"/>
-    <ds:schemaRef ds:uri="4873beb7-5857-4685-be1f-d57550cc96cc"/>
-    <ds:schemaRef ds:uri="http://schemas.openxmlformats.org/package/2006/metadata/core-properties"/>
-    <ds:schemaRef ds:uri="http://purl.org/dc/terms/"/>
-    <ds:schemaRef ds:uri="http://schemas.microsoft.com/office/2006/documentManagement/types"/>
-    <ds:schemaRef ds:uri="http://schemas.microsoft.com/office/infopath/2007/PartnerControls"/>
-    <ds:schemaRef ds:uri="http://www.w3.org/XML/1998/namespace"/>
-    <ds:schemaRef ds:uri="http://purl.org/dc/dcmitype/"/>
-  </ds:schemaRefs>
-</ds:datastoreItem>
-</file>
-
-<file path=customXml/itemProps2.xml><?xml version="1.0" encoding="utf-8"?>
 <ds:datastoreItem xmlns:ds="http://schemas.openxmlformats.org/officeDocument/2006/customXml" ds:itemID="{28C8B9CA-0273-4370-889A-FC05DA5C2FA5}">
   <ds:schemaRefs>
     <ds:schemaRef ds:uri="http://schemas.microsoft.com/office/2006/metadata/contentType"/>
@@ -8520,6 +8910,22 @@
 </ds:datastoreItem>
 </file>
 
+<file path=customXml/itemProps2.xml><?xml version="1.0" encoding="utf-8"?>
+<ds:datastoreItem xmlns:ds="http://schemas.openxmlformats.org/officeDocument/2006/customXml" ds:itemID="{8CDDBB83-77C1-4099-A0AA-289882E745E2}">
+  <ds:schemaRefs>
+    <ds:schemaRef ds:uri="http://purl.org/dc/elements/1.1/"/>
+    <ds:schemaRef ds:uri="http://schemas.microsoft.com/office/2006/metadata/properties"/>
+    <ds:schemaRef ds:uri="4873beb7-5857-4685-be1f-d57550cc96cc"/>
+    <ds:schemaRef ds:uri="http://schemas.openxmlformats.org/package/2006/metadata/core-properties"/>
+    <ds:schemaRef ds:uri="http://purl.org/dc/terms/"/>
+    <ds:schemaRef ds:uri="http://schemas.microsoft.com/office/2006/documentManagement/types"/>
+    <ds:schemaRef ds:uri="http://schemas.microsoft.com/office/infopath/2007/PartnerControls"/>
+    <ds:schemaRef ds:uri="http://www.w3.org/XML/1998/namespace"/>
+    <ds:schemaRef ds:uri="http://purl.org/dc/dcmitype/"/>
+  </ds:schemaRefs>
+</ds:datastoreItem>
+</file>
+
 <file path=customXml/itemProps3.xml><?xml version="1.0" encoding="utf-8"?>
 <ds:datastoreItem xmlns:ds="http://schemas.openxmlformats.org/officeDocument/2006/customXml" ds:itemID="{561E720F-F05D-4536-9C34-0CFCED65D3B7}">
   <ds:schemaRefs>

</xml_diff>